<commit_message>
Code Review and Interceptor
</commit_message>
<xml_diff>
--- a/PPT/Code Review.pptx
+++ b/PPT/Code Review.pptx
@@ -5,18 +5,20 @@
     <p:sldMasterId id="2147483649" r:id="rId1"/>
   </p:sldMasterIdLst>
   <p:notesMasterIdLst>
-    <p:notesMasterId r:id="rId8"/>
+    <p:notesMasterId r:id="rId10"/>
   </p:notesMasterIdLst>
   <p:handoutMasterIdLst>
-    <p:handoutMasterId r:id="rId9"/>
+    <p:handoutMasterId r:id="rId11"/>
   </p:handoutMasterIdLst>
   <p:sldIdLst>
     <p:sldId id="1000" r:id="rId2"/>
     <p:sldId id="1483" r:id="rId3"/>
-    <p:sldId id="1484" r:id="rId4"/>
-    <p:sldId id="1485" r:id="rId5"/>
-    <p:sldId id="1486" r:id="rId6"/>
-    <p:sldId id="1477" r:id="rId7"/>
+    <p:sldId id="1488" r:id="rId4"/>
+    <p:sldId id="1484" r:id="rId5"/>
+    <p:sldId id="1485" r:id="rId6"/>
+    <p:sldId id="1487" r:id="rId7"/>
+    <p:sldId id="1486" r:id="rId8"/>
+    <p:sldId id="1477" r:id="rId9"/>
   </p:sldIdLst>
   <p:sldSz cx="9144000" cy="6858000" type="screen4x3"/>
   <p:notesSz cx="6888163" cy="10020300"/>
@@ -269,7 +271,7 @@
               <a:pPr>
                 <a:defRPr/>
               </a:pPr>
-              <a:t>1/20/2017</a:t>
+              <a:t>1/23/2017</a:t>
             </a:fld>
             <a:endParaRPr lang="en-GB"/>
           </a:p>
@@ -6346,7 +6348,7 @@
               <a:pPr>
                 <a:defRPr/>
               </a:pPr>
-              <a:t>6</a:t>
+              <a:t>8</a:t>
             </a:fld>
             <a:endParaRPr lang="fr-FR"/>
           </a:p>
@@ -9880,11 +9882,7 @@
           <a:p>
             <a:r>
               <a:rPr lang="en-US" dirty="0" smtClean="0"/>
-              <a:t>NGM </a:t>
-            </a:r>
-            <a:r>
-              <a:rPr lang="en-US" dirty="0" smtClean="0"/>
-              <a:t>Counter and validation</a:t>
+              <a:t>NGM Counter and validation</a:t>
             </a:r>
           </a:p>
           <a:p>
@@ -9996,7 +9994,7 @@
           <a:p>
             <a:r>
               <a:rPr lang="en-US" dirty="0" smtClean="0"/>
-              <a:t>Transaction</a:t>
+              <a:t>Transaction – 1</a:t>
             </a:r>
             <a:endParaRPr lang="en-US" dirty="0"/>
           </a:p>
@@ -10018,36 +10016,8 @@
           <a:lstStyle/>
           <a:p>
             <a:r>
-              <a:rPr lang="en-US" b="1" dirty="0" smtClean="0">
-                <a:solidFill>
-                  <a:srgbClr val="FF0000"/>
-                </a:solidFill>
-              </a:rPr>
-              <a:t>62</a:t>
-            </a:r>
-            <a:r>
-              <a:rPr lang="en-US" dirty="0" smtClean="0"/>
-              <a:t> </a:t>
-            </a:r>
-            <a:r>
-              <a:rPr lang="en-US" dirty="0" err="1"/>
-              <a:t>TransactionAttributeType.</a:t>
-            </a:r>
-            <a:r>
-              <a:rPr lang="en-US" b="1" i="1" dirty="0" err="1"/>
-              <a:t>REQUIRES_NEW</a:t>
-            </a:r>
-            <a:endParaRPr lang="en-US" dirty="0" smtClean="0"/>
-          </a:p>
-          <a:p>
-            <a:pPr lvl="1"/>
-            <a:r>
-              <a:rPr lang="en-US" dirty="0" err="1" smtClean="0"/>
-              <a:t>ProvisionTaskGenerationServiceBean.generateProvisioningTask</a:t>
-            </a:r>
-            <a:r>
-              <a:rPr lang="en-US" dirty="0" smtClean="0"/>
-              <a:t>(String</a:t>
+              <a:rPr lang="en-US" dirty="0"/>
+              <a:t>com.gemalto.osmsr.provisioning.clustering.SmsrSingletonProvisioningService.ProvisioningFileScanTimer.timerExpired(Timer</a:t>
             </a:r>
             <a:r>
               <a:rPr lang="en-US" dirty="0" smtClean="0"/>
@@ -10055,117 +10025,29 @@
             </a:r>
           </a:p>
           <a:p>
-            <a:pPr lvl="2"/>
+            <a:endParaRPr lang="en-US" dirty="0"/>
+          </a:p>
+          <a:p>
             <a:r>
               <a:rPr lang="en-US" dirty="0"/>
-              <a:t>provisionTaskGenerationService.generateProvisioningTaskInNewTransaction(</a:t>
+              <a:t>com.gemalto.osmsr.service.impl.EisService.validateECASDAndStoreEIS4SrChange(</a:t>
             </a:r>
             <a:r>
               <a:rPr lang="en-US" dirty="0" err="1"/>
-              <a:t>batchFile</a:t>
-            </a:r>
-            <a:r>
-              <a:rPr lang="en-US" dirty="0" smtClean="0"/>
-              <a:t>);</a:t>
-            </a:r>
-          </a:p>
-          <a:p>
-            <a:pPr lvl="1"/>
-            <a:r>
-              <a:rPr lang="en-US" dirty="0" err="1" smtClean="0"/>
-              <a:t>ProcessControllerBean.cancelUseCase</a:t>
-            </a:r>
-            <a:r>
-              <a:rPr lang="en-US" dirty="0" smtClean="0"/>
-              <a:t>(Long)</a:t>
-            </a:r>
-          </a:p>
-          <a:p>
-            <a:pPr lvl="2"/>
-            <a:r>
-              <a:rPr lang="en-US" dirty="0" smtClean="0"/>
-              <a:t>Not necessary </a:t>
+              <a:t>EISType</a:t>
             </a:r>
             <a:r>
               <a:rPr lang="en-US" dirty="0"/>
-              <a:t>to start a new </a:t>
-            </a:r>
-            <a:r>
-              <a:rPr lang="en-US" dirty="0" smtClean="0"/>
-              <a:t>one, </a:t>
-            </a:r>
-            <a:r>
-              <a:rPr lang="en-US" dirty="0" err="1" smtClean="0"/>
-              <a:t>UseCaseUIService.cancelOperation</a:t>
-            </a:r>
-            <a:r>
-              <a:rPr lang="en-US" dirty="0" smtClean="0"/>
-              <a:t>(Long) already start one</a:t>
-            </a:r>
-            <a:endParaRPr lang="en-US" dirty="0" smtClean="0"/>
-          </a:p>
-          <a:p>
-            <a:pPr lvl="2"/>
-            <a:endParaRPr lang="en-US" dirty="0"/>
-          </a:p>
-          <a:p>
-            <a:r>
-              <a:rPr lang="en-US" dirty="0" err="1" smtClean="0"/>
-              <a:t>TransactionAttributeType.</a:t>
-            </a:r>
-            <a:r>
-              <a:rPr lang="en-US" b="1" i="1" dirty="0" err="1" smtClean="0"/>
-              <a:t>NOT_SUPPORTED</a:t>
-            </a:r>
-            <a:endParaRPr lang="en-US" b="1" i="1" dirty="0" smtClean="0"/>
-          </a:p>
-          <a:p>
-            <a:pPr lvl="1"/>
-            <a:r>
-              <a:rPr lang="en-US" dirty="0"/>
-              <a:t>com.gemalto.osmsr.core.control.impl.ProcessControllerBean.cleanStuckUseCases</a:t>
-            </a:r>
-            <a:r>
-              <a:rPr lang="en-US" dirty="0" smtClean="0"/>
-              <a:t>()</a:t>
-            </a:r>
-          </a:p>
-          <a:p>
-            <a:pPr lvl="2"/>
-            <a:r>
-              <a:rPr lang="en-US" dirty="0" smtClean="0"/>
-              <a:t>Maybe </a:t>
-            </a:r>
-            <a:r>
-              <a:rPr lang="en-US" dirty="0"/>
-              <a:t>‘</a:t>
-            </a:r>
-            <a:r>
-              <a:rPr lang="en-US" dirty="0" err="1" smtClean="0"/>
-              <a:t>TransactionAttributeType.Never</a:t>
-            </a:r>
-            <a:r>
-              <a:rPr lang="en-US" dirty="0" smtClean="0"/>
-              <a:t>’ is better.</a:t>
-            </a:r>
-          </a:p>
-          <a:p>
-            <a:endParaRPr lang="en-US" dirty="0"/>
-          </a:p>
-          <a:p>
-            <a:r>
-              <a:rPr lang="en-US" dirty="0" err="1" smtClean="0"/>
-              <a:t>ViewController</a:t>
-            </a:r>
-            <a:r>
-              <a:rPr lang="en-US" dirty="0" smtClean="0"/>
-              <a:t> won’t start a transaction</a:t>
-            </a:r>
-          </a:p>
-          <a:p>
-            <a:endParaRPr lang="en-US" dirty="0"/>
-          </a:p>
-          <a:p>
+              <a:t>, String, </a:t>
+            </a:r>
+            <a:r>
+              <a:rPr lang="en-US" dirty="0" err="1"/>
+              <a:t>boolean</a:t>
+            </a:r>
+            <a:r>
+              <a:rPr lang="en-US"/>
+              <a:t>)</a:t>
+            </a:r>
             <a:endParaRPr lang="en-US" dirty="0"/>
           </a:p>
         </p:txBody>
@@ -10228,7 +10110,7 @@
     </p:spTree>
     <p:extLst>
       <p:ext uri="{BB962C8B-B14F-4D97-AF65-F5344CB8AC3E}">
-        <p14:creationId xmlns:p14="http://schemas.microsoft.com/office/powerpoint/2010/main" val="4057870096"/>
+        <p14:creationId xmlns:p14="http://schemas.microsoft.com/office/powerpoint/2010/main" val="1143786802"/>
       </p:ext>
     </p:extLst>
   </p:cSld>
@@ -10272,7 +10154,7 @@
           <a:p>
             <a:r>
               <a:rPr lang="en-US" dirty="0" smtClean="0"/>
-              <a:t>Method with too many parameters</a:t>
+              <a:t>Transaction – 2</a:t>
             </a:r>
             <a:endParaRPr lang="en-US" dirty="0"/>
           </a:p>
@@ -10290,119 +10172,193 @@
         </p:nvSpPr>
         <p:spPr/>
         <p:txBody>
-          <a:bodyPr/>
+          <a:bodyPr>
+            <a:normAutofit fontScale="85000" lnSpcReduction="20000"/>
+          </a:bodyPr>
           <a:lstStyle/>
           <a:p>
             <a:r>
+              <a:rPr lang="en-US" b="1" dirty="0" smtClean="0">
+                <a:solidFill>
+                  <a:srgbClr val="FF0000"/>
+                </a:solidFill>
+              </a:rPr>
+              <a:t>62</a:t>
+            </a:r>
+            <a:r>
               <a:rPr lang="en-US" dirty="0" smtClean="0"/>
-              <a:t>It’s better no more than 4</a:t>
-            </a:r>
+              <a:t> </a:t>
+            </a:r>
+            <a:r>
+              <a:rPr lang="en-US" dirty="0" err="1"/>
+              <a:t>TransactionAttributeType.</a:t>
+            </a:r>
+            <a:r>
+              <a:rPr lang="en-US" b="1" i="1" dirty="0" err="1"/>
+              <a:t>REQUIRES_NEW</a:t>
+            </a:r>
+            <a:endParaRPr lang="en-US" dirty="0" smtClean="0"/>
           </a:p>
           <a:p>
             <a:pPr lvl="1"/>
             <a:r>
+              <a:rPr lang="en-US" dirty="0" err="1" smtClean="0"/>
+              <a:t>ProvisionTaskGenerationServiceBean.generateProvisioningTask</a:t>
+            </a:r>
+            <a:r>
               <a:rPr lang="en-US" dirty="0" smtClean="0"/>
-              <a:t>EisHandler.toES7EISTypeVO(</a:t>
-            </a:r>
+              <a:t>(String)</a:t>
+            </a:r>
+          </a:p>
+          <a:p>
+            <a:pPr lvl="2"/>
+            <a:r>
+              <a:rPr lang="en-US" dirty="0"/>
+              <a:t>provisionTaskGenerationService.generateProvisioningTaskInNewTransaction(</a:t>
+            </a:r>
+            <a:r>
+              <a:rPr lang="en-US" dirty="0" err="1"/>
+              <a:t>batchFile</a:t>
+            </a:r>
+            <a:r>
+              <a:rPr lang="en-US" dirty="0" smtClean="0"/>
+              <a:t>);</a:t>
+            </a:r>
+          </a:p>
+          <a:p>
+            <a:pPr lvl="1"/>
             <a:r>
               <a:rPr lang="en-US" dirty="0" err="1" smtClean="0"/>
-              <a:t>Hashtable</a:t>
+              <a:t>ProcessControllerBean.cancelUseCase</a:t>
             </a:r>
             <a:r>
               <a:rPr lang="en-US" dirty="0" smtClean="0"/>
-              <a:t>&lt;String</a:t>
+              <a:t>(Long)</a:t>
+            </a:r>
+          </a:p>
+          <a:p>
+            <a:pPr lvl="2"/>
+            <a:r>
+              <a:rPr lang="en-US" dirty="0" smtClean="0"/>
+              <a:t>Not necessary </a:t>
             </a:r>
             <a:r>
               <a:rPr lang="en-US" dirty="0"/>
-              <a:t>, String&gt;, </a:t>
-            </a:r>
-            <a:r>
-              <a:rPr lang="en-US" dirty="0" err="1"/>
-              <a:t>ISecurityServiceLocal</a:t>
-            </a:r>
+              <a:t>to start a new </a:t>
+            </a:r>
+            <a:r>
+              <a:rPr lang="en-US" dirty="0" smtClean="0"/>
+              <a:t>one, </a:t>
+            </a:r>
+            <a:r>
+              <a:rPr lang="en-US" dirty="0" err="1" smtClean="0"/>
+              <a:t>UseCaseUIService.cancelOperation</a:t>
+            </a:r>
+            <a:r>
+              <a:rPr lang="en-US" dirty="0" smtClean="0"/>
+              <a:t>(Long) already start one</a:t>
+            </a:r>
+          </a:p>
+          <a:p>
+            <a:pPr lvl="2"/>
+            <a:endParaRPr lang="en-US" dirty="0"/>
+          </a:p>
+          <a:p>
+            <a:r>
+              <a:rPr lang="en-US" dirty="0" err="1" smtClean="0"/>
+              <a:t>TransactionAttributeType.</a:t>
+            </a:r>
+            <a:r>
+              <a:rPr lang="en-US" b="1" i="1" dirty="0" err="1" smtClean="0"/>
+              <a:t>NOT_SUPPORTED</a:t>
+            </a:r>
+            <a:endParaRPr lang="en-US" b="1" i="1" dirty="0" smtClean="0"/>
+          </a:p>
+          <a:p>
+            <a:pPr lvl="1"/>
             <a:r>
               <a:rPr lang="en-US" dirty="0"/>
-              <a:t>, </a:t>
-            </a:r>
-            <a:r>
-              <a:rPr lang="en-US" dirty="0" err="1"/>
-              <a:t>IEmbeddedCardCRUDLocal</a:t>
+              <a:t>com.gemalto.osmsr.core.control.impl.ProcessControllerBean.cleanStuckUseCases</a:t>
+            </a:r>
+            <a:r>
+              <a:rPr lang="en-US" dirty="0" smtClean="0"/>
+              <a:t>()</a:t>
+            </a:r>
+          </a:p>
+          <a:p>
+            <a:pPr lvl="2"/>
+            <a:r>
+              <a:rPr lang="en-US" dirty="0" smtClean="0"/>
+              <a:t>Maybe </a:t>
             </a:r>
             <a:r>
               <a:rPr lang="en-US" dirty="0"/>
-              <a:t>, </a:t>
-            </a:r>
-            <a:r>
-              <a:rPr lang="en-US" dirty="0" err="1"/>
-              <a:t>IOrganizationTrigramsCRUDLocal</a:t>
-            </a:r>
+              <a:t>‘</a:t>
+            </a:r>
+            <a:r>
+              <a:rPr lang="en-US" dirty="0" err="1" smtClean="0"/>
+              <a:t>TransactionAttributeType.Never</a:t>
+            </a:r>
+            <a:r>
+              <a:rPr lang="en-US" dirty="0" smtClean="0"/>
+              <a:t>’.</a:t>
+            </a:r>
+          </a:p>
+          <a:p>
+            <a:endParaRPr lang="en-US" dirty="0" smtClean="0"/>
+          </a:p>
+          <a:p>
+            <a:r>
+              <a:rPr lang="en-US" dirty="0" err="1" smtClean="0"/>
+              <a:t>com.gemalto.osmsr.provisioning.file.impl.FileSystemManagerBean</a:t>
+            </a:r>
+            <a:endParaRPr lang="en-US" dirty="0" smtClean="0"/>
+          </a:p>
+          <a:p>
+            <a:pPr lvl="1"/>
+            <a:r>
+              <a:rPr lang="en-US" dirty="0" smtClean="0"/>
+              <a:t>No Transaction needed</a:t>
+            </a:r>
+            <a:endParaRPr lang="en-US" dirty="0"/>
+          </a:p>
+          <a:p>
+            <a:endParaRPr lang="en-US" dirty="0" smtClean="0"/>
+          </a:p>
+          <a:p>
+            <a:r>
+              <a:rPr lang="en-US" dirty="0" err="1" smtClean="0"/>
+              <a:t>SingletonService</a:t>
+            </a:r>
+            <a:r>
+              <a:rPr lang="en-US" dirty="0" smtClean="0"/>
+              <a:t> won’t start a transaction</a:t>
+            </a:r>
+          </a:p>
+          <a:p>
+            <a:pPr lvl="1"/>
             <a:r>
               <a:rPr lang="en-US" dirty="0"/>
-              <a:t>, </a:t>
-            </a:r>
-            <a:r>
-              <a:rPr lang="en-US" dirty="0" err="1"/>
-              <a:t>IEuiccPropertyServiceLocal</a:t>
-            </a:r>
-            <a:r>
-              <a:rPr lang="en-US" dirty="0"/>
-              <a:t>, </a:t>
-            </a:r>
-            <a:r>
-              <a:rPr lang="en-US" dirty="0" err="1"/>
-              <a:t>IOperationHistoryCRUDLocal</a:t>
-            </a:r>
-            <a:r>
-              <a:rPr lang="en-US" dirty="0"/>
-              <a:t>, </a:t>
-            </a:r>
-            <a:r>
-              <a:rPr lang="en-US" dirty="0" err="1"/>
-              <a:t>IEmbeddedCardHistoryCRUDLocal</a:t>
-            </a:r>
-            <a:r>
-              <a:rPr lang="en-US" dirty="0"/>
-              <a:t>, </a:t>
-            </a:r>
-            <a:r>
-              <a:rPr lang="en-US" dirty="0" err="1"/>
-              <a:t>IConfigurationManagerLocal</a:t>
-            </a:r>
-            <a:r>
-              <a:rPr lang="en-US" dirty="0"/>
-              <a:t>)</a:t>
-            </a:r>
-          </a:p>
-          <a:p>
+              <a:t>com.gemalto.osmsr.provisioning.clustering.SmsrSingletonProvisioningService.ProvisioningFileScanTimer.timerExpired(Timer)</a:t>
+            </a:r>
+          </a:p>
+          <a:p>
+            <a:endParaRPr lang="en-US" dirty="0" smtClean="0"/>
+          </a:p>
+          <a:p>
+            <a:r>
+              <a:rPr lang="en-US" dirty="0" err="1" smtClean="0"/>
+              <a:t>ViewController</a:t>
+            </a:r>
             <a:r>
               <a:rPr lang="en-US" dirty="0" smtClean="0"/>
-              <a:t>How to reduce the number of parameters</a:t>
-            </a:r>
-          </a:p>
-          <a:p>
-            <a:pPr lvl="1"/>
-            <a:r>
-              <a:rPr lang="en-US" dirty="0" smtClean="0"/>
-              <a:t>For constructor, think about ‘Builder’</a:t>
-            </a:r>
-          </a:p>
-          <a:p>
-            <a:pPr lvl="1"/>
-            <a:r>
-              <a:rPr lang="en-US" dirty="0" smtClean="0"/>
-              <a:t>Split one method into many</a:t>
-            </a:r>
-          </a:p>
-          <a:p>
-            <a:pPr lvl="1"/>
-            <a:r>
-              <a:rPr lang="en-US" dirty="0" smtClean="0"/>
-              <a:t>Create helper class: </a:t>
-            </a:r>
-            <a:r>
-              <a:rPr lang="en-US" dirty="0" err="1" smtClean="0"/>
-              <a:t>XXXContext</a:t>
-            </a:r>
+              <a:t> won’t start a transaction</a:t>
+            </a:r>
+          </a:p>
+          <a:p>
+            <a:endParaRPr lang="en-US" dirty="0"/>
+          </a:p>
+          <a:p>
             <a:endParaRPr lang="en-US" dirty="0"/>
           </a:p>
         </p:txBody>
@@ -10465,7 +10421,7 @@
     </p:spTree>
     <p:extLst>
       <p:ext uri="{BB962C8B-B14F-4D97-AF65-F5344CB8AC3E}">
-        <p14:creationId xmlns:p14="http://schemas.microsoft.com/office/powerpoint/2010/main" val="1573037011"/>
+        <p14:creationId xmlns:p14="http://schemas.microsoft.com/office/powerpoint/2010/main" val="4057870096"/>
       </p:ext>
     </p:extLst>
   </p:cSld>
@@ -10509,7 +10465,7 @@
           <a:p>
             <a:r>
               <a:rPr lang="en-US" dirty="0" smtClean="0"/>
-              <a:t>MDC</a:t>
+              <a:t>Method with too many parameters</a:t>
             </a:r>
             <a:endParaRPr lang="en-US" dirty="0"/>
           </a:p>
@@ -10530,7 +10486,117 @@
           <a:bodyPr/>
           <a:lstStyle/>
           <a:p>
-            <a:endParaRPr lang="en-US"/>
+            <a:r>
+              <a:rPr lang="en-US" dirty="0" smtClean="0"/>
+              <a:t>It’s better no more than 4</a:t>
+            </a:r>
+          </a:p>
+          <a:p>
+            <a:pPr lvl="1"/>
+            <a:r>
+              <a:rPr lang="en-US" dirty="0" smtClean="0"/>
+              <a:t>EisHandler.toES7EISTypeVO(</a:t>
+            </a:r>
+            <a:r>
+              <a:rPr lang="en-US" dirty="0" err="1" smtClean="0"/>
+              <a:t>Hashtable</a:t>
+            </a:r>
+            <a:r>
+              <a:rPr lang="en-US" dirty="0" smtClean="0"/>
+              <a:t>&lt;String</a:t>
+            </a:r>
+            <a:r>
+              <a:rPr lang="en-US" dirty="0"/>
+              <a:t>, String&gt;, </a:t>
+            </a:r>
+            <a:r>
+              <a:rPr lang="en-US" dirty="0" err="1"/>
+              <a:t>ISecurityServiceLocal</a:t>
+            </a:r>
+            <a:r>
+              <a:rPr lang="en-US" dirty="0"/>
+              <a:t>, </a:t>
+            </a:r>
+            <a:r>
+              <a:rPr lang="en-US" dirty="0" err="1"/>
+              <a:t>IEmbeddedCardCRUDLocal</a:t>
+            </a:r>
+            <a:r>
+              <a:rPr lang="en-US" dirty="0"/>
+              <a:t>, </a:t>
+            </a:r>
+            <a:r>
+              <a:rPr lang="en-US" dirty="0" err="1"/>
+              <a:t>IOrganizationTrigramsCRUDLocal</a:t>
+            </a:r>
+            <a:r>
+              <a:rPr lang="en-US" dirty="0"/>
+              <a:t>, </a:t>
+            </a:r>
+            <a:r>
+              <a:rPr lang="en-US" dirty="0" err="1"/>
+              <a:t>IEuiccPropertyServiceLocal</a:t>
+            </a:r>
+            <a:r>
+              <a:rPr lang="en-US" dirty="0"/>
+              <a:t>, </a:t>
+            </a:r>
+            <a:r>
+              <a:rPr lang="en-US" dirty="0" err="1"/>
+              <a:t>IOperationHistoryCRUDLocal</a:t>
+            </a:r>
+            <a:r>
+              <a:rPr lang="en-US" dirty="0"/>
+              <a:t>, </a:t>
+            </a:r>
+            <a:r>
+              <a:rPr lang="en-US" dirty="0" err="1"/>
+              <a:t>IEmbeddedCardHistoryCRUDLocal</a:t>
+            </a:r>
+            <a:r>
+              <a:rPr lang="en-US" dirty="0"/>
+              <a:t>, </a:t>
+            </a:r>
+            <a:r>
+              <a:rPr lang="en-US" dirty="0" err="1"/>
+              <a:t>IConfigurationManagerLocal</a:t>
+            </a:r>
+            <a:r>
+              <a:rPr lang="en-US" dirty="0"/>
+              <a:t>)</a:t>
+            </a:r>
+          </a:p>
+          <a:p>
+            <a:r>
+              <a:rPr lang="en-US" dirty="0" smtClean="0"/>
+              <a:t>How to reduce the number of parameters</a:t>
+            </a:r>
+          </a:p>
+          <a:p>
+            <a:pPr lvl="1"/>
+            <a:r>
+              <a:rPr lang="en-US" dirty="0" smtClean="0"/>
+              <a:t>For constructor, think about ‘Builder’</a:t>
+            </a:r>
+          </a:p>
+          <a:p>
+            <a:pPr lvl="1"/>
+            <a:r>
+              <a:rPr lang="en-US" dirty="0" smtClean="0"/>
+              <a:t>Split one method into many</a:t>
+            </a:r>
+          </a:p>
+          <a:p>
+            <a:pPr lvl="1"/>
+            <a:r>
+              <a:rPr lang="en-US" dirty="0" smtClean="0"/>
+              <a:t>Create helper class: </a:t>
+            </a:r>
+            <a:r>
+              <a:rPr lang="en-US" dirty="0" err="1" smtClean="0"/>
+              <a:t>XXXContext</a:t>
+            </a:r>
+            <a:endParaRPr lang="en-US" dirty="0"/>
           </a:p>
         </p:txBody>
       </p:sp>
@@ -10592,6 +10658,398 @@
     </p:spTree>
     <p:extLst>
       <p:ext uri="{BB962C8B-B14F-4D97-AF65-F5344CB8AC3E}">
+        <p14:creationId xmlns:p14="http://schemas.microsoft.com/office/powerpoint/2010/main" val="1573037011"/>
+      </p:ext>
+    </p:extLst>
+  </p:cSld>
+  <p:clrMapOvr>
+    <a:masterClrMapping/>
+  </p:clrMapOvr>
+</p:sld>
+</file>
+
+<file path=ppt/slides/slide6.xml><?xml version="1.0" encoding="utf-8"?>
+<p:sld xmlns:a="http://schemas.openxmlformats.org/drawingml/2006/main" xmlns:r="http://schemas.openxmlformats.org/officeDocument/2006/relationships" xmlns:p="http://schemas.openxmlformats.org/presentationml/2006/main">
+  <p:cSld>
+    <p:spTree>
+      <p:nvGrpSpPr>
+        <p:cNvPr id="1" name=""/>
+        <p:cNvGrpSpPr/>
+        <p:nvPr/>
+      </p:nvGrpSpPr>
+      <p:grpSpPr>
+        <a:xfrm>
+          <a:off x="0" y="0"/>
+          <a:ext cx="0" cy="0"/>
+          <a:chOff x="0" y="0"/>
+          <a:chExt cx="0" cy="0"/>
+        </a:xfrm>
+      </p:grpSpPr>
+      <p:sp>
+        <p:nvSpPr>
+          <p:cNvPr id="2" name="Title 1"/>
+          <p:cNvSpPr>
+            <a:spLocks noGrp="1"/>
+          </p:cNvSpPr>
+          <p:nvPr>
+            <p:ph type="title"/>
+          </p:nvPr>
+        </p:nvSpPr>
+        <p:spPr/>
+        <p:txBody>
+          <a:bodyPr/>
+          <a:lstStyle/>
+          <a:p>
+            <a:r>
+              <a:rPr lang="en-US" dirty="0" smtClean="0"/>
+              <a:t>Interceptor</a:t>
+            </a:r>
+            <a:endParaRPr lang="en-US" dirty="0"/>
+          </a:p>
+        </p:txBody>
+      </p:sp>
+      <p:sp>
+        <p:nvSpPr>
+          <p:cNvPr id="3" name="Content Placeholder 2"/>
+          <p:cNvSpPr>
+            <a:spLocks noGrp="1"/>
+          </p:cNvSpPr>
+          <p:nvPr>
+            <p:ph idx="1"/>
+          </p:nvPr>
+        </p:nvSpPr>
+        <p:spPr>
+          <a:xfrm>
+            <a:off x="790574" y="1446213"/>
+            <a:ext cx="7597849" cy="4646612"/>
+          </a:xfrm>
+        </p:spPr>
+        <p:txBody>
+          <a:bodyPr>
+            <a:normAutofit fontScale="85000" lnSpcReduction="10000"/>
+          </a:bodyPr>
+          <a:lstStyle/>
+          <a:p>
+            <a:r>
+              <a:rPr lang="en-US" dirty="0" smtClean="0"/>
+              <a:t>com.gemalto.osmsr.service.v31.interceptors.WSIncomingInterceptor</a:t>
+            </a:r>
+          </a:p>
+          <a:p>
+            <a:pPr lvl="1"/>
+            <a:r>
+              <a:rPr lang="en-US" dirty="0" err="1" smtClean="0">
+                <a:solidFill>
+                  <a:srgbClr val="FF0000"/>
+                </a:solidFill>
+              </a:rPr>
+              <a:t>objectNames</a:t>
+            </a:r>
+            <a:endParaRPr lang="en-US" dirty="0" smtClean="0">
+              <a:solidFill>
+                <a:srgbClr val="FF0000"/>
+              </a:solidFill>
+            </a:endParaRPr>
+          </a:p>
+          <a:p>
+            <a:endParaRPr lang="en-US" dirty="0" smtClean="0">
+              <a:solidFill>
+                <a:srgbClr val="FF0000"/>
+              </a:solidFill>
+            </a:endParaRPr>
+          </a:p>
+          <a:p>
+            <a:r>
+              <a:rPr lang="en-US" strike="sngStrike" dirty="0" smtClean="0"/>
+              <a:t>com.gemalto.osmsr.component.ats.api.interceptor.AuditInterceptor</a:t>
+            </a:r>
+          </a:p>
+          <a:p>
+            <a:endParaRPr lang="en-US" dirty="0" smtClean="0"/>
+          </a:p>
+          <a:p>
+            <a:r>
+              <a:rPr lang="en-US" dirty="0" err="1" smtClean="0"/>
+              <a:t>com.gemalto.osmsr.core.interceptors.UseCaseFinishedInterceptor</a:t>
+            </a:r>
+            <a:endParaRPr lang="en-US" dirty="0" smtClean="0"/>
+          </a:p>
+          <a:p>
+            <a:pPr lvl="1"/>
+            <a:r>
+              <a:rPr lang="en-US" dirty="0" err="1" smtClean="0">
+                <a:solidFill>
+                  <a:srgbClr val="FF0000"/>
+                </a:solidFill>
+              </a:rPr>
+              <a:t>AbstractUseCasePerformInterceptor.objectNames</a:t>
+            </a:r>
+            <a:endParaRPr lang="en-US" dirty="0" smtClean="0">
+              <a:solidFill>
+                <a:srgbClr val="FF0000"/>
+              </a:solidFill>
+            </a:endParaRPr>
+          </a:p>
+          <a:p>
+            <a:pPr lvl="1"/>
+            <a:endParaRPr lang="en-US" dirty="0" smtClean="0"/>
+          </a:p>
+          <a:p>
+            <a:r>
+              <a:rPr lang="en-US" dirty="0" err="1" smtClean="0"/>
+              <a:t>com.gemalto.osmsr.core.interceptors.UseCaseStartedInterceptor</a:t>
+            </a:r>
+            <a:endParaRPr lang="en-US" dirty="0" smtClean="0"/>
+          </a:p>
+          <a:p>
+            <a:pPr lvl="1"/>
+            <a:r>
+              <a:rPr lang="en-US" dirty="0" err="1" smtClean="0">
+                <a:solidFill>
+                  <a:srgbClr val="FF0000"/>
+                </a:solidFill>
+              </a:rPr>
+              <a:t>AbstractUseCasePerformInterceptor.objectNames</a:t>
+            </a:r>
+            <a:endParaRPr lang="en-US" dirty="0" smtClean="0">
+              <a:solidFill>
+                <a:srgbClr val="FF0000"/>
+              </a:solidFill>
+            </a:endParaRPr>
+          </a:p>
+          <a:p>
+            <a:pPr lvl="1"/>
+            <a:endParaRPr lang="en-US" dirty="0" smtClean="0"/>
+          </a:p>
+          <a:p>
+            <a:r>
+              <a:rPr lang="en-US" dirty="0" smtClean="0"/>
+              <a:t>com.gemalto.osmsr.monitoring.interceptors.ProvisionCounterInterceptor</a:t>
+            </a:r>
+          </a:p>
+          <a:p>
+            <a:endParaRPr lang="en-US" dirty="0" smtClean="0"/>
+          </a:p>
+          <a:p>
+            <a:r>
+              <a:rPr lang="en-US" dirty="0" err="1" smtClean="0"/>
+              <a:t>com.gemalto.osmsr.monitoring.interceptors.WSOutgoingInterceptor</a:t>
+            </a:r>
+            <a:endParaRPr lang="en-US" dirty="0" smtClean="0"/>
+          </a:p>
+          <a:p>
+            <a:pPr lvl="1"/>
+            <a:r>
+              <a:rPr lang="en-US" dirty="0">
+                <a:solidFill>
+                  <a:srgbClr val="FF0000"/>
+                </a:solidFill>
+              </a:rPr>
+              <a:t>es3ObjectNames, es4ObjectNames, es4ExtObjectNames, es4EvoObjectNames</a:t>
+            </a:r>
+            <a:endParaRPr lang="en-US" dirty="0" smtClean="0">
+              <a:solidFill>
+                <a:srgbClr val="FF0000"/>
+              </a:solidFill>
+            </a:endParaRPr>
+          </a:p>
+          <a:p>
+            <a:endParaRPr lang="en-US" dirty="0"/>
+          </a:p>
+          <a:p>
+            <a:r>
+              <a:rPr lang="en-US" dirty="0" err="1"/>
+              <a:t>com.gemalto.common.tools.interceptor.ApiLoggerInterceptor</a:t>
+            </a:r>
+            <a:endParaRPr lang="en-US" dirty="0" smtClean="0"/>
+          </a:p>
+        </p:txBody>
+      </p:sp>
+      <p:sp>
+        <p:nvSpPr>
+          <p:cNvPr id="4" name="Slide Number Placeholder 3"/>
+          <p:cNvSpPr>
+            <a:spLocks noGrp="1"/>
+          </p:cNvSpPr>
+          <p:nvPr>
+            <p:ph type="sldNum" sz="quarter" idx="10"/>
+          </p:nvPr>
+        </p:nvSpPr>
+        <p:spPr/>
+        <p:txBody>
+          <a:bodyPr/>
+          <a:lstStyle/>
+          <a:p>
+            <a:pPr>
+              <a:defRPr/>
+            </a:pPr>
+            <a:fld id="{924122BF-7BF8-427C-B7B6-4209414200B1}" type="slidenum">
+              <a:rPr lang="en-US" smtClean="0"/>
+              <a:pPr>
+                <a:defRPr/>
+              </a:pPr>
+              <a:t>6</a:t>
+            </a:fld>
+            <a:endParaRPr lang="en-US"/>
+          </a:p>
+        </p:txBody>
+      </p:sp>
+      <p:sp>
+        <p:nvSpPr>
+          <p:cNvPr id="5" name="Footer Placeholder 4"/>
+          <p:cNvSpPr>
+            <a:spLocks noGrp="1"/>
+          </p:cNvSpPr>
+          <p:nvPr>
+            <p:ph type="ftr" sz="quarter" idx="11"/>
+          </p:nvPr>
+        </p:nvSpPr>
+        <p:spPr/>
+        <p:txBody>
+          <a:bodyPr/>
+          <a:lstStyle/>
+          <a:p>
+            <a:pPr>
+              <a:defRPr/>
+            </a:pPr>
+            <a:r>
+              <a:rPr lang="en-US" smtClean="0"/>
+              <a:t>Gemalto Private</a:t>
+            </a:r>
+            <a:endParaRPr lang="en-US"/>
+          </a:p>
+        </p:txBody>
+      </p:sp>
+    </p:spTree>
+    <p:extLst>
+      <p:ext uri="{BB962C8B-B14F-4D97-AF65-F5344CB8AC3E}">
+        <p14:creationId xmlns:p14="http://schemas.microsoft.com/office/powerpoint/2010/main" val="2199713593"/>
+      </p:ext>
+    </p:extLst>
+  </p:cSld>
+  <p:clrMapOvr>
+    <a:masterClrMapping/>
+  </p:clrMapOvr>
+</p:sld>
+</file>
+
+<file path=ppt/slides/slide7.xml><?xml version="1.0" encoding="utf-8"?>
+<p:sld xmlns:a="http://schemas.openxmlformats.org/drawingml/2006/main" xmlns:r="http://schemas.openxmlformats.org/officeDocument/2006/relationships" xmlns:p="http://schemas.openxmlformats.org/presentationml/2006/main">
+  <p:cSld>
+    <p:spTree>
+      <p:nvGrpSpPr>
+        <p:cNvPr id="1" name=""/>
+        <p:cNvGrpSpPr/>
+        <p:nvPr/>
+      </p:nvGrpSpPr>
+      <p:grpSpPr>
+        <a:xfrm>
+          <a:off x="0" y="0"/>
+          <a:ext cx="0" cy="0"/>
+          <a:chOff x="0" y="0"/>
+          <a:chExt cx="0" cy="0"/>
+        </a:xfrm>
+      </p:grpSpPr>
+      <p:sp>
+        <p:nvSpPr>
+          <p:cNvPr id="2" name="Title 1"/>
+          <p:cNvSpPr>
+            <a:spLocks noGrp="1"/>
+          </p:cNvSpPr>
+          <p:nvPr>
+            <p:ph type="title"/>
+          </p:nvPr>
+        </p:nvSpPr>
+        <p:spPr/>
+        <p:txBody>
+          <a:bodyPr/>
+          <a:lstStyle/>
+          <a:p>
+            <a:r>
+              <a:rPr lang="en-US" dirty="0" smtClean="0"/>
+              <a:t>MDC</a:t>
+            </a:r>
+            <a:endParaRPr lang="en-US" dirty="0"/>
+          </a:p>
+        </p:txBody>
+      </p:sp>
+      <p:sp>
+        <p:nvSpPr>
+          <p:cNvPr id="3" name="Content Placeholder 2"/>
+          <p:cNvSpPr>
+            <a:spLocks noGrp="1"/>
+          </p:cNvSpPr>
+          <p:nvPr>
+            <p:ph idx="1"/>
+          </p:nvPr>
+        </p:nvSpPr>
+        <p:spPr/>
+        <p:txBody>
+          <a:bodyPr/>
+          <a:lstStyle/>
+          <a:p>
+            <a:endParaRPr lang="en-US"/>
+          </a:p>
+        </p:txBody>
+      </p:sp>
+      <p:sp>
+        <p:nvSpPr>
+          <p:cNvPr id="4" name="Slide Number Placeholder 3"/>
+          <p:cNvSpPr>
+            <a:spLocks noGrp="1"/>
+          </p:cNvSpPr>
+          <p:nvPr>
+            <p:ph type="sldNum" sz="quarter" idx="10"/>
+          </p:nvPr>
+        </p:nvSpPr>
+        <p:spPr/>
+        <p:txBody>
+          <a:bodyPr/>
+          <a:lstStyle/>
+          <a:p>
+            <a:pPr>
+              <a:defRPr/>
+            </a:pPr>
+            <a:fld id="{924122BF-7BF8-427C-B7B6-4209414200B1}" type="slidenum">
+              <a:rPr lang="en-US" smtClean="0"/>
+              <a:pPr>
+                <a:defRPr/>
+              </a:pPr>
+              <a:t>7</a:t>
+            </a:fld>
+            <a:endParaRPr lang="en-US"/>
+          </a:p>
+        </p:txBody>
+      </p:sp>
+      <p:sp>
+        <p:nvSpPr>
+          <p:cNvPr id="5" name="Footer Placeholder 4"/>
+          <p:cNvSpPr>
+            <a:spLocks noGrp="1"/>
+          </p:cNvSpPr>
+          <p:nvPr>
+            <p:ph type="ftr" sz="quarter" idx="11"/>
+          </p:nvPr>
+        </p:nvSpPr>
+        <p:spPr/>
+        <p:txBody>
+          <a:bodyPr/>
+          <a:lstStyle/>
+          <a:p>
+            <a:pPr>
+              <a:defRPr/>
+            </a:pPr>
+            <a:r>
+              <a:rPr lang="en-US" smtClean="0"/>
+              <a:t>Gemalto Private</a:t>
+            </a:r>
+            <a:endParaRPr lang="en-US"/>
+          </a:p>
+        </p:txBody>
+      </p:sp>
+    </p:spTree>
+    <p:extLst>
+      <p:ext uri="{BB962C8B-B14F-4D97-AF65-F5344CB8AC3E}">
         <p14:creationId xmlns:p14="http://schemas.microsoft.com/office/powerpoint/2010/main" val="2934454010"/>
       </p:ext>
     </p:extLst>
@@ -10602,7 +11060,7 @@
 </p:sld>
 </file>
 
-<file path=ppt/slides/slide6.xml><?xml version="1.0" encoding="utf-8"?>
+<file path=ppt/slides/slide8.xml><?xml version="1.0" encoding="utf-8"?>
 <p:sld xmlns:a="http://schemas.openxmlformats.org/drawingml/2006/main" xmlns:r="http://schemas.openxmlformats.org/officeDocument/2006/relationships" xmlns:p="http://schemas.openxmlformats.org/presentationml/2006/main">
   <p:cSld>
     <p:spTree>
@@ -10871,7 +11329,7 @@
             <a:fld id="{65E5F03D-E4FB-4D20-ADDD-2FFC593848C5}" type="slidenum">
               <a:rPr lang="en-US" smtClean="0"/>
               <a:pPr/>
-              <a:t>6</a:t>
+              <a:t>8</a:t>
             </a:fld>
             <a:endParaRPr lang="en-US" smtClean="0"/>
           </a:p>

</xml_diff>

<commit_message>
Code Review & Log4j
</commit_message>
<xml_diff>
--- a/PPT/Code Review.pptx
+++ b/PPT/Code Review.pptx
@@ -5,10 +5,10 @@
     <p:sldMasterId id="2147483649" r:id="rId1"/>
   </p:sldMasterIdLst>
   <p:notesMasterIdLst>
-    <p:notesMasterId r:id="rId13"/>
+    <p:notesMasterId r:id="rId14"/>
   </p:notesMasterIdLst>
   <p:handoutMasterIdLst>
-    <p:handoutMasterId r:id="rId14"/>
+    <p:handoutMasterId r:id="rId15"/>
   </p:handoutMasterIdLst>
   <p:sldIdLst>
     <p:sldId id="1000" r:id="rId2"/>
@@ -21,7 +21,8 @@
     <p:sldId id="1489" r:id="rId9"/>
     <p:sldId id="1490" r:id="rId10"/>
     <p:sldId id="1491" r:id="rId11"/>
-    <p:sldId id="1477" r:id="rId12"/>
+    <p:sldId id="1492" r:id="rId12"/>
+    <p:sldId id="1477" r:id="rId13"/>
   </p:sldIdLst>
   <p:sldSz cx="9144000" cy="6858000" type="screen4x3"/>
   <p:notesSz cx="6888163" cy="10020300"/>
@@ -274,7 +275,7 @@
               <a:pPr>
                 <a:defRPr/>
               </a:pPr>
-              <a:t>2/6/2017</a:t>
+              <a:t>2/22/2017</a:t>
             </a:fld>
             <a:endParaRPr lang="en-GB"/>
           </a:p>
@@ -1929,7 +1930,7 @@
               <a:pPr>
                 <a:defRPr/>
               </a:pPr>
-              <a:t>11</a:t>
+              <a:t>12</a:t>
             </a:fld>
             <a:endParaRPr lang="fr-FR"/>
           </a:p>
@@ -5572,6 +5573,421 @@
       </p:grpSpPr>
       <p:sp>
         <p:nvSpPr>
+          <p:cNvPr id="2" name="Title 1"/>
+          <p:cNvSpPr>
+            <a:spLocks noGrp="1"/>
+          </p:cNvSpPr>
+          <p:nvPr>
+            <p:ph type="title"/>
+          </p:nvPr>
+        </p:nvSpPr>
+        <p:spPr/>
+        <p:txBody>
+          <a:bodyPr/>
+          <a:lstStyle/>
+          <a:p>
+            <a:r>
+              <a:rPr lang="en-US" dirty="0" err="1"/>
+              <a:t>java.io.Serializable</a:t>
+            </a:r>
+            <a:endParaRPr lang="en-US" dirty="0"/>
+          </a:p>
+        </p:txBody>
+      </p:sp>
+      <p:sp>
+        <p:nvSpPr>
+          <p:cNvPr id="3" name="Content Placeholder 2"/>
+          <p:cNvSpPr>
+            <a:spLocks noGrp="1"/>
+          </p:cNvSpPr>
+          <p:nvPr>
+            <p:ph idx="1"/>
+          </p:nvPr>
+        </p:nvSpPr>
+        <p:spPr/>
+        <p:txBody>
+          <a:bodyPr>
+            <a:normAutofit fontScale="70000" lnSpcReduction="20000"/>
+          </a:bodyPr>
+          <a:lstStyle/>
+          <a:p>
+            <a:r>
+              <a:rPr lang="en-US" dirty="0" smtClean="0"/>
+              <a:t>Has </a:t>
+            </a:r>
+            <a:r>
+              <a:rPr lang="en-US" i="1" dirty="0" smtClean="0"/>
+              <a:t>“</a:t>
+            </a:r>
+            <a:r>
+              <a:rPr lang="en-US" b="1" i="1" dirty="0" err="1" smtClean="0"/>
+              <a:t>serialVersionUID</a:t>
+            </a:r>
+            <a:r>
+              <a:rPr lang="en-US" i="1" dirty="0" smtClean="0"/>
+              <a:t>”</a:t>
+            </a:r>
+          </a:p>
+          <a:p>
+            <a:pPr lvl="1"/>
+            <a:r>
+              <a:rPr lang="en-US" dirty="0" smtClean="0"/>
+              <a:t>Different format</a:t>
+            </a:r>
+          </a:p>
+          <a:p>
+            <a:pPr lvl="2"/>
+            <a:r>
+              <a:rPr lang="en-US" dirty="0" smtClean="0"/>
+              <a:t>No impact</a:t>
+            </a:r>
+          </a:p>
+          <a:p>
+            <a:pPr lvl="1"/>
+            <a:r>
+              <a:rPr lang="en-US" dirty="0" smtClean="0"/>
+              <a:t>Add new field / </a:t>
+            </a:r>
+            <a:r>
+              <a:rPr lang="en-US" dirty="0"/>
+              <a:t>Remove one </a:t>
+            </a:r>
+            <a:r>
+              <a:rPr lang="en-US" dirty="0" smtClean="0"/>
+              <a:t>field</a:t>
+            </a:r>
+          </a:p>
+          <a:p>
+            <a:pPr lvl="2"/>
+            <a:r>
+              <a:rPr lang="en-US" dirty="0" smtClean="0"/>
+              <a:t>No impact</a:t>
+            </a:r>
+          </a:p>
+          <a:p>
+            <a:pPr lvl="1"/>
+            <a:r>
+              <a:rPr lang="en-US" dirty="0" smtClean="0"/>
+              <a:t>Rename one field</a:t>
+            </a:r>
+          </a:p>
+          <a:p>
+            <a:pPr lvl="2"/>
+            <a:r>
+              <a:rPr lang="en-US" dirty="0" smtClean="0"/>
+              <a:t>Can be </a:t>
+            </a:r>
+            <a:r>
+              <a:rPr lang="en-US" dirty="0" err="1" smtClean="0"/>
+              <a:t>deserialized</a:t>
+            </a:r>
+            <a:endParaRPr lang="en-US" dirty="0" smtClean="0"/>
+          </a:p>
+          <a:p>
+            <a:pPr lvl="2"/>
+            <a:r>
+              <a:rPr lang="en-US" dirty="0" smtClean="0"/>
+              <a:t>Value of the renamed field cannot be set</a:t>
+            </a:r>
+          </a:p>
+          <a:p>
+            <a:pPr lvl="1"/>
+            <a:r>
+              <a:rPr lang="en-US" dirty="0" smtClean="0"/>
+              <a:t>Add new method / </a:t>
+            </a:r>
+            <a:r>
+              <a:rPr lang="en-US" dirty="0"/>
+              <a:t>Remove one </a:t>
+            </a:r>
+            <a:r>
+              <a:rPr lang="en-US" dirty="0" smtClean="0"/>
+              <a:t>method / </a:t>
+            </a:r>
+            <a:r>
+              <a:rPr lang="en-US" dirty="0"/>
+              <a:t>Rename one method</a:t>
+            </a:r>
+            <a:endParaRPr lang="en-US" dirty="0" smtClean="0"/>
+          </a:p>
+          <a:p>
+            <a:pPr lvl="2"/>
+            <a:r>
+              <a:rPr lang="en-US" dirty="0" smtClean="0"/>
+              <a:t>No impact</a:t>
+            </a:r>
+          </a:p>
+          <a:p>
+            <a:pPr lvl="1"/>
+            <a:r>
+              <a:rPr lang="en-US" dirty="0" smtClean="0"/>
+              <a:t>Update type of one field</a:t>
+            </a:r>
+          </a:p>
+          <a:p>
+            <a:pPr lvl="2"/>
+            <a:r>
+              <a:rPr lang="en-US" dirty="0" smtClean="0"/>
+              <a:t>If primitive type / String, error: </a:t>
+            </a:r>
+            <a:r>
+              <a:rPr lang="en-US" dirty="0"/>
+              <a:t>incompatible types for </a:t>
+            </a:r>
+            <a:r>
+              <a:rPr lang="en-US" dirty="0" smtClean="0"/>
+              <a:t>field …</a:t>
+            </a:r>
+          </a:p>
+          <a:p>
+            <a:pPr lvl="2"/>
+            <a:r>
+              <a:rPr lang="en-US" dirty="0" smtClean="0"/>
+              <a:t>If Object, can be update to super class</a:t>
+            </a:r>
+          </a:p>
+          <a:p>
+            <a:pPr lvl="2"/>
+            <a:endParaRPr lang="en-US" dirty="0" smtClean="0"/>
+          </a:p>
+          <a:p>
+            <a:endParaRPr lang="en-US" dirty="0"/>
+          </a:p>
+          <a:p>
+            <a:r>
+              <a:rPr lang="en-US" dirty="0" smtClean="0"/>
+              <a:t>No “</a:t>
+            </a:r>
+            <a:r>
+              <a:rPr lang="en-US" b="1" i="1" dirty="0" err="1"/>
+              <a:t>serialVersionUID</a:t>
+            </a:r>
+            <a:r>
+              <a:rPr lang="en-US" dirty="0" smtClean="0"/>
+              <a:t>”</a:t>
+            </a:r>
+          </a:p>
+          <a:p>
+            <a:pPr lvl="1"/>
+            <a:r>
+              <a:rPr lang="en-US" dirty="0" smtClean="0"/>
+              <a:t>Different format</a:t>
+            </a:r>
+          </a:p>
+          <a:p>
+            <a:pPr lvl="2"/>
+            <a:r>
+              <a:rPr lang="en-US" dirty="0" smtClean="0"/>
+              <a:t>No impact</a:t>
+            </a:r>
+          </a:p>
+          <a:p>
+            <a:pPr lvl="1"/>
+            <a:r>
+              <a:rPr lang="en-US" dirty="0" smtClean="0"/>
+              <a:t>Add new field / Remove one field / Rename one field</a:t>
+            </a:r>
+          </a:p>
+          <a:p>
+            <a:pPr lvl="2"/>
+            <a:r>
+              <a:rPr lang="en-US" dirty="0" err="1" smtClean="0"/>
+              <a:t>java.io.InvalidClassException</a:t>
+            </a:r>
+            <a:endParaRPr lang="en-US" dirty="0" smtClean="0"/>
+          </a:p>
+          <a:p>
+            <a:pPr lvl="2"/>
+            <a:r>
+              <a:rPr lang="en-US" dirty="0"/>
+              <a:t>local class incompatible: stream </a:t>
+            </a:r>
+            <a:r>
+              <a:rPr lang="en-US" dirty="0" err="1"/>
+              <a:t>classdesc</a:t>
+            </a:r>
+            <a:r>
+              <a:rPr lang="en-US" dirty="0"/>
+              <a:t> </a:t>
+            </a:r>
+            <a:r>
+              <a:rPr lang="en-US" dirty="0" err="1"/>
+              <a:t>serialVersionUID</a:t>
+            </a:r>
+            <a:r>
+              <a:rPr lang="en-US" dirty="0"/>
+              <a:t> = </a:t>
+            </a:r>
+            <a:r>
+              <a:rPr lang="en-US" dirty="0" smtClean="0"/>
+              <a:t>…, </a:t>
+            </a:r>
+            <a:r>
+              <a:rPr lang="en-US" dirty="0"/>
+              <a:t>local class </a:t>
+            </a:r>
+            <a:r>
+              <a:rPr lang="en-US" dirty="0" err="1"/>
+              <a:t>serialVersionUID</a:t>
+            </a:r>
+            <a:r>
+              <a:rPr lang="en-US" dirty="0"/>
+              <a:t> = </a:t>
+            </a:r>
+            <a:r>
+              <a:rPr lang="en-US" dirty="0" smtClean="0"/>
+              <a:t>…</a:t>
+            </a:r>
+          </a:p>
+          <a:p>
+            <a:pPr lvl="1"/>
+            <a:r>
+              <a:rPr lang="en-US" dirty="0" smtClean="0"/>
+              <a:t>Add new method / Remove </a:t>
+            </a:r>
+            <a:r>
+              <a:rPr lang="en-US" dirty="0"/>
+              <a:t>one </a:t>
+            </a:r>
+            <a:r>
+              <a:rPr lang="en-US" dirty="0" smtClean="0"/>
+              <a:t>method / Rename one method</a:t>
+            </a:r>
+          </a:p>
+          <a:p>
+            <a:pPr lvl="2"/>
+            <a:r>
+              <a:rPr lang="en-US" dirty="0" smtClean="0"/>
+              <a:t>Error, same as above</a:t>
+            </a:r>
+          </a:p>
+          <a:p>
+            <a:pPr lvl="1"/>
+            <a:r>
+              <a:rPr lang="en-US" dirty="0" smtClean="0"/>
+              <a:t>Update type of one field</a:t>
+            </a:r>
+          </a:p>
+          <a:p>
+            <a:pPr lvl="2"/>
+            <a:r>
+              <a:rPr lang="en-US" dirty="0" smtClean="0"/>
+              <a:t>Error, same </a:t>
+            </a:r>
+            <a:r>
+              <a:rPr lang="en-US" smtClean="0"/>
+              <a:t>as above</a:t>
+            </a:r>
+            <a:endParaRPr lang="en-US" dirty="0" smtClean="0"/>
+          </a:p>
+          <a:p>
+            <a:pPr lvl="2"/>
+            <a:endParaRPr lang="en-US" dirty="0"/>
+          </a:p>
+          <a:p>
+            <a:r>
+              <a:rPr lang="en-US" dirty="0" smtClean="0"/>
+              <a:t>Key word “</a:t>
+            </a:r>
+            <a:r>
+              <a:rPr lang="en-US" b="1" dirty="0" smtClean="0"/>
+              <a:t>transient</a:t>
+            </a:r>
+            <a:r>
+              <a:rPr lang="en-US" dirty="0" smtClean="0"/>
+              <a:t>”</a:t>
+            </a:r>
+            <a:endParaRPr lang="en-US" dirty="0"/>
+          </a:p>
+        </p:txBody>
+      </p:sp>
+      <p:sp>
+        <p:nvSpPr>
+          <p:cNvPr id="4" name="Slide Number Placeholder 3"/>
+          <p:cNvSpPr>
+            <a:spLocks noGrp="1"/>
+          </p:cNvSpPr>
+          <p:nvPr>
+            <p:ph type="sldNum" sz="quarter" idx="10"/>
+          </p:nvPr>
+        </p:nvSpPr>
+        <p:spPr/>
+        <p:txBody>
+          <a:bodyPr/>
+          <a:lstStyle/>
+          <a:p>
+            <a:pPr>
+              <a:defRPr/>
+            </a:pPr>
+            <a:fld id="{924122BF-7BF8-427C-B7B6-4209414200B1}" type="slidenum">
+              <a:rPr lang="en-US" smtClean="0"/>
+              <a:pPr>
+                <a:defRPr/>
+              </a:pPr>
+              <a:t>11</a:t>
+            </a:fld>
+            <a:endParaRPr lang="en-US"/>
+          </a:p>
+        </p:txBody>
+      </p:sp>
+      <p:sp>
+        <p:nvSpPr>
+          <p:cNvPr id="5" name="Footer Placeholder 4"/>
+          <p:cNvSpPr>
+            <a:spLocks noGrp="1"/>
+          </p:cNvSpPr>
+          <p:nvPr>
+            <p:ph type="ftr" sz="quarter" idx="11"/>
+          </p:nvPr>
+        </p:nvSpPr>
+        <p:spPr/>
+        <p:txBody>
+          <a:bodyPr/>
+          <a:lstStyle/>
+          <a:p>
+            <a:pPr>
+              <a:defRPr/>
+            </a:pPr>
+            <a:r>
+              <a:rPr lang="en-US" smtClean="0"/>
+              <a:t>Gemalto Private</a:t>
+            </a:r>
+            <a:endParaRPr lang="en-US"/>
+          </a:p>
+        </p:txBody>
+      </p:sp>
+    </p:spTree>
+    <p:extLst>
+      <p:ext uri="{BB962C8B-B14F-4D97-AF65-F5344CB8AC3E}">
+        <p14:creationId xmlns:p14="http://schemas.microsoft.com/office/powerpoint/2010/main" val="1906548668"/>
+      </p:ext>
+    </p:extLst>
+  </p:cSld>
+  <p:clrMapOvr>
+    <a:masterClrMapping/>
+  </p:clrMapOvr>
+</p:sld>
+</file>
+
+<file path=ppt/slides/slide12.xml><?xml version="1.0" encoding="utf-8"?>
+<p:sld xmlns:a="http://schemas.openxmlformats.org/drawingml/2006/main" xmlns:r="http://schemas.openxmlformats.org/officeDocument/2006/relationships" xmlns:p="http://schemas.openxmlformats.org/presentationml/2006/main">
+  <p:cSld>
+    <p:spTree>
+      <p:nvGrpSpPr>
+        <p:cNvPr id="1" name=""/>
+        <p:cNvGrpSpPr/>
+        <p:nvPr/>
+      </p:nvGrpSpPr>
+      <p:grpSpPr>
+        <a:xfrm>
+          <a:off x="0" y="0"/>
+          <a:ext cx="0" cy="0"/>
+          <a:chOff x="0" y="0"/>
+          <a:chExt cx="0" cy="0"/>
+        </a:xfrm>
+      </p:grpSpPr>
+      <p:sp>
+        <p:nvSpPr>
           <p:cNvPr id="5122" name="Title 1"/>
           <p:cNvSpPr>
             <a:spLocks noGrp="1"/>
@@ -5822,7 +6238,7 @@
             <a:fld id="{65E5F03D-E4FB-4D20-ADDD-2FFC593848C5}" type="slidenum">
               <a:rPr lang="en-US" smtClean="0"/>
               <a:pPr/>
-              <a:t>11</a:t>
+              <a:t>12</a:t>
             </a:fld>
             <a:endParaRPr lang="en-US" smtClean="0"/>
           </a:p>

</xml_diff>